<commit_message>
Update Conference Project Presentation_Modified.pptx
</commit_message>
<xml_diff>
--- a/Conference Project Presentation_Modified.pptx
+++ b/Conference Project Presentation_Modified.pptx
@@ -129,7 +129,7 @@
   </p:defaultTextStyle>
   <p:extLst>
     <p:ext uri="{EFAFB233-063F-42B5-8137-9DF3F51BA10A}">
-      <p15:sldGuideLst xmlns:p15="http://schemas.microsoft.com/office/powerpoint/2012/main" xmlns="">
+      <p15:sldGuideLst xmlns:p15="http://schemas.microsoft.com/office/powerpoint/2012/main">
         <p15:guide id="1" orient="horz" pos="2160">
           <p15:clr>
             <a:srgbClr val="A4A3A4"/>
@@ -1377,13 +1377,6 @@
         </dgm:presLayoutVars>
       </dgm:prSet>
       <dgm:spPr/>
-      <dgm:t>
-        <a:bodyPr/>
-        <a:lstStyle/>
-        <a:p>
-          <a:endParaRPr lang="en-US"/>
-        </a:p>
-      </dgm:t>
     </dgm:pt>
     <dgm:pt modelId="{27B221B6-3B4B-4B51-9B9C-619023E7CB81}" type="pres">
       <dgm:prSet presAssocID="{679D11D8-611E-4F6E-86F9-01C0563FAFB6}" presName="compNode" presStyleCnt="0"/>
@@ -1407,10 +1400,10 @@
           <a:blip xmlns:r="http://schemas.openxmlformats.org/officeDocument/2006/relationships" r:embed="rId1">
             <a:extLst>
               <a:ext uri="{28A0092B-C50C-407E-A947-70E740481C1C}">
-                <a14:useLocalDpi xmlns:a14="http://schemas.microsoft.com/office/drawing/2010/main" xmlns="" val="0"/>
+                <a14:useLocalDpi xmlns:a14="http://schemas.microsoft.com/office/drawing/2010/main" val="0"/>
               </a:ext>
               <a:ext uri="{96DAC541-7B7A-43D3-8B79-37D633B846F1}">
-                <asvg:svgBlip xmlns:asvg="http://schemas.microsoft.com/office/drawing/2016/SVG/main" xmlns="" r:embed="rId2"/>
+                <asvg:svgBlip xmlns:asvg="http://schemas.microsoft.com/office/drawing/2016/SVG/main" r:embed="rId2"/>
               </a:ext>
             </a:extLst>
           </a:blip>
@@ -1435,13 +1428,6 @@
         </dgm:presLayoutVars>
       </dgm:prSet>
       <dgm:spPr/>
-      <dgm:t>
-        <a:bodyPr/>
-        <a:lstStyle/>
-        <a:p>
-          <a:endParaRPr lang="en-US"/>
-        </a:p>
-      </dgm:t>
     </dgm:pt>
     <dgm:pt modelId="{4AFD78B5-B3D5-49DF-98F5-EB60AF954BC0}" type="pres">
       <dgm:prSet presAssocID="{FFE1E1A3-83AE-43D6-B5C0-EA8FDE0E1442}" presName="sibTrans" presStyleCnt="0"/>
@@ -1469,10 +1455,10 @@
           <a:blip xmlns:r="http://schemas.openxmlformats.org/officeDocument/2006/relationships" r:embed="rId3">
             <a:extLst>
               <a:ext uri="{28A0092B-C50C-407E-A947-70E740481C1C}">
-                <a14:useLocalDpi xmlns:a14="http://schemas.microsoft.com/office/drawing/2010/main" xmlns="" val="0"/>
+                <a14:useLocalDpi xmlns:a14="http://schemas.microsoft.com/office/drawing/2010/main" val="0"/>
               </a:ext>
               <a:ext uri="{96DAC541-7B7A-43D3-8B79-37D633B846F1}">
-                <asvg:svgBlip xmlns:asvg="http://schemas.microsoft.com/office/drawing/2016/SVG/main" xmlns="" r:embed="rId4"/>
+                <asvg:svgBlip xmlns:asvg="http://schemas.microsoft.com/office/drawing/2016/SVG/main" r:embed="rId4"/>
               </a:ext>
             </a:extLst>
           </a:blip>
@@ -1497,13 +1483,6 @@
         </dgm:presLayoutVars>
       </dgm:prSet>
       <dgm:spPr/>
-      <dgm:t>
-        <a:bodyPr/>
-        <a:lstStyle/>
-        <a:p>
-          <a:endParaRPr lang="en-US"/>
-        </a:p>
-      </dgm:t>
     </dgm:pt>
     <dgm:pt modelId="{CD9619F4-3D8A-425F-80DF-D10E8A3A312F}" type="pres">
       <dgm:prSet presAssocID="{900E401F-DB9B-43A9-868E-AB4B6866ED7C}" presName="sibTrans" presStyleCnt="0"/>
@@ -1531,10 +1510,10 @@
           <a:blip xmlns:r="http://schemas.openxmlformats.org/officeDocument/2006/relationships" r:embed="rId5">
             <a:extLst>
               <a:ext uri="{28A0092B-C50C-407E-A947-70E740481C1C}">
-                <a14:useLocalDpi xmlns:a14="http://schemas.microsoft.com/office/drawing/2010/main" xmlns="" val="0"/>
+                <a14:useLocalDpi xmlns:a14="http://schemas.microsoft.com/office/drawing/2010/main" val="0"/>
               </a:ext>
               <a:ext uri="{96DAC541-7B7A-43D3-8B79-37D633B846F1}">
-                <asvg:svgBlip xmlns:asvg="http://schemas.microsoft.com/office/drawing/2016/SVG/main" xmlns="" r:embed="rId6"/>
+                <asvg:svgBlip xmlns:asvg="http://schemas.microsoft.com/office/drawing/2016/SVG/main" r:embed="rId6"/>
               </a:ext>
             </a:extLst>
           </a:blip>
@@ -1559,13 +1538,6 @@
         </dgm:presLayoutVars>
       </dgm:prSet>
       <dgm:spPr/>
-      <dgm:t>
-        <a:bodyPr/>
-        <a:lstStyle/>
-        <a:p>
-          <a:endParaRPr lang="en-US"/>
-        </a:p>
-      </dgm:t>
     </dgm:pt>
     <dgm:pt modelId="{B56F76C0-3289-4673-8645-4CC8DE777642}" type="pres">
       <dgm:prSet presAssocID="{BC42980E-4A98-4D7F-98F9-2CADEFF1A1DB}" presName="sibTrans" presStyleCnt="0"/>
@@ -1593,10 +1565,10 @@
           <a:blip xmlns:r="http://schemas.openxmlformats.org/officeDocument/2006/relationships" r:embed="rId7">
             <a:extLst>
               <a:ext uri="{28A0092B-C50C-407E-A947-70E740481C1C}">
-                <a14:useLocalDpi xmlns:a14="http://schemas.microsoft.com/office/drawing/2010/main" xmlns="" val="0"/>
+                <a14:useLocalDpi xmlns:a14="http://schemas.microsoft.com/office/drawing/2010/main" val="0"/>
               </a:ext>
               <a:ext uri="{96DAC541-7B7A-43D3-8B79-37D633B846F1}">
-                <asvg:svgBlip xmlns:asvg="http://schemas.microsoft.com/office/drawing/2016/SVG/main" xmlns="" r:embed="rId8"/>
+                <asvg:svgBlip xmlns:asvg="http://schemas.microsoft.com/office/drawing/2016/SVG/main" r:embed="rId8"/>
               </a:ext>
             </a:extLst>
           </a:blip>
@@ -1621,13 +1593,6 @@
         </dgm:presLayoutVars>
       </dgm:prSet>
       <dgm:spPr/>
-      <dgm:t>
-        <a:bodyPr/>
-        <a:lstStyle/>
-        <a:p>
-          <a:endParaRPr lang="en-US"/>
-        </a:p>
-      </dgm:t>
     </dgm:pt>
     <dgm:pt modelId="{2E890FEA-1163-4942-8260-EC59132D8ECD}" type="pres">
       <dgm:prSet presAssocID="{61E469D9-6D14-491F-8C97-3934588AEEFC}" presName="sibTrans" presStyleCnt="0"/>
@@ -1655,10 +1620,10 @@
           <a:blip xmlns:r="http://schemas.openxmlformats.org/officeDocument/2006/relationships" r:embed="rId9">
             <a:extLst>
               <a:ext uri="{28A0092B-C50C-407E-A947-70E740481C1C}">
-                <a14:useLocalDpi xmlns:a14="http://schemas.microsoft.com/office/drawing/2010/main" xmlns="" val="0"/>
+                <a14:useLocalDpi xmlns:a14="http://schemas.microsoft.com/office/drawing/2010/main" val="0"/>
               </a:ext>
               <a:ext uri="{96DAC541-7B7A-43D3-8B79-37D633B846F1}">
-                <asvg:svgBlip xmlns:asvg="http://schemas.microsoft.com/office/drawing/2016/SVG/main" xmlns="" r:embed="rId10"/>
+                <asvg:svgBlip xmlns:asvg="http://schemas.microsoft.com/office/drawing/2016/SVG/main" r:embed="rId10"/>
               </a:ext>
             </a:extLst>
           </a:blip>
@@ -1683,13 +1648,6 @@
         </dgm:presLayoutVars>
       </dgm:prSet>
       <dgm:spPr/>
-      <dgm:t>
-        <a:bodyPr/>
-        <a:lstStyle/>
-        <a:p>
-          <a:endParaRPr lang="en-US"/>
-        </a:p>
-      </dgm:t>
     </dgm:pt>
     <dgm:pt modelId="{0D821B25-50CB-4484-8FB7-DF2EE8003C12}" type="pres">
       <dgm:prSet presAssocID="{C49E696E-028E-40B2-A9F1-AE6356291417}" presName="sibTrans" presStyleCnt="0"/>
@@ -1717,10 +1675,10 @@
           <a:blip xmlns:r="http://schemas.openxmlformats.org/officeDocument/2006/relationships" r:embed="rId11">
             <a:extLst>
               <a:ext uri="{28A0092B-C50C-407E-A947-70E740481C1C}">
-                <a14:useLocalDpi xmlns:a14="http://schemas.microsoft.com/office/drawing/2010/main" xmlns="" val="0"/>
+                <a14:useLocalDpi xmlns:a14="http://schemas.microsoft.com/office/drawing/2010/main" val="0"/>
               </a:ext>
               <a:ext uri="{96DAC541-7B7A-43D3-8B79-37D633B846F1}">
-                <asvg:svgBlip xmlns:asvg="http://schemas.microsoft.com/office/drawing/2016/SVG/main" xmlns="" r:embed="rId12"/>
+                <asvg:svgBlip xmlns:asvg="http://schemas.microsoft.com/office/drawing/2016/SVG/main" r:embed="rId12"/>
               </a:ext>
             </a:extLst>
           </a:blip>
@@ -1745,13 +1703,6 @@
         </dgm:presLayoutVars>
       </dgm:prSet>
       <dgm:spPr/>
-      <dgm:t>
-        <a:bodyPr/>
-        <a:lstStyle/>
-        <a:p>
-          <a:endParaRPr lang="en-US"/>
-        </a:p>
-      </dgm:t>
     </dgm:pt>
     <dgm:pt modelId="{18F0BC58-EA0D-4717-8545-2F8030137B7C}" type="pres">
       <dgm:prSet presAssocID="{B33ACB36-DCAD-4CD5-B4D7-BEAF5583F22E}" presName="sibTrans" presStyleCnt="0"/>
@@ -1779,10 +1730,10 @@
           <a:blip xmlns:r="http://schemas.openxmlformats.org/officeDocument/2006/relationships" r:embed="rId13">
             <a:extLst>
               <a:ext uri="{28A0092B-C50C-407E-A947-70E740481C1C}">
-                <a14:useLocalDpi xmlns:a14="http://schemas.microsoft.com/office/drawing/2010/main" xmlns="" val="0"/>
+                <a14:useLocalDpi xmlns:a14="http://schemas.microsoft.com/office/drawing/2010/main" val="0"/>
               </a:ext>
               <a:ext uri="{96DAC541-7B7A-43D3-8B79-37D633B846F1}">
-                <asvg:svgBlip xmlns:asvg="http://schemas.microsoft.com/office/drawing/2016/SVG/main" xmlns="" r:embed="rId14"/>
+                <asvg:svgBlip xmlns:asvg="http://schemas.microsoft.com/office/drawing/2016/SVG/main" r:embed="rId14"/>
               </a:ext>
             </a:extLst>
           </a:blip>
@@ -1807,13 +1758,6 @@
         </dgm:presLayoutVars>
       </dgm:prSet>
       <dgm:spPr/>
-      <dgm:t>
-        <a:bodyPr/>
-        <a:lstStyle/>
-        <a:p>
-          <a:endParaRPr lang="en-US"/>
-        </a:p>
-      </dgm:t>
     </dgm:pt>
     <dgm:pt modelId="{BE6F98CA-1F87-47C8-A82E-5535371DF124}" type="pres">
       <dgm:prSet presAssocID="{BAB752CC-1DF4-496B-BFA2-FAFE774B482E}" presName="sibTrans" presStyleCnt="0"/>
@@ -1841,10 +1785,10 @@
           <a:blip xmlns:r="http://schemas.openxmlformats.org/officeDocument/2006/relationships" r:embed="rId15">
             <a:extLst>
               <a:ext uri="{28A0092B-C50C-407E-A947-70E740481C1C}">
-                <a14:useLocalDpi xmlns:a14="http://schemas.microsoft.com/office/drawing/2010/main" xmlns="" val="0"/>
+                <a14:useLocalDpi xmlns:a14="http://schemas.microsoft.com/office/drawing/2010/main" val="0"/>
               </a:ext>
               <a:ext uri="{96DAC541-7B7A-43D3-8B79-37D633B846F1}">
-                <asvg:svgBlip xmlns:asvg="http://schemas.microsoft.com/office/drawing/2016/SVG/main" xmlns="" r:embed="rId16"/>
+                <asvg:svgBlip xmlns:asvg="http://schemas.microsoft.com/office/drawing/2016/SVG/main" r:embed="rId16"/>
               </a:ext>
             </a:extLst>
           </a:blip>
@@ -1869,33 +1813,26 @@
         </dgm:presLayoutVars>
       </dgm:prSet>
       <dgm:spPr/>
-      <dgm:t>
-        <a:bodyPr/>
-        <a:lstStyle/>
-        <a:p>
-          <a:endParaRPr lang="en-US"/>
-        </a:p>
-      </dgm:t>
     </dgm:pt>
   </dgm:ptLst>
   <dgm:cxnLst>
-    <dgm:cxn modelId="{FF9F44B4-FA54-4F2E-8115-3D3ACAD5B3D3}" type="presOf" srcId="{D02C8016-8D26-449E-9AE3-F292FD0EA24F}" destId="{AC492AA3-0DA5-4E31-830D-818AAF164180}" srcOrd="0" destOrd="0" presId="urn:microsoft.com/office/officeart/2018/5/layout/IconLeafLabelList"/>
     <dgm:cxn modelId="{61222501-D7FD-4B1E-8712-3B521CB9A8F9}" type="presOf" srcId="{679D11D8-611E-4F6E-86F9-01C0563FAFB6}" destId="{BE8619A9-6773-423D-89A7-FA585A55F789}" srcOrd="0" destOrd="0" presId="urn:microsoft.com/office/officeart/2018/5/layout/IconLeafLabelList"/>
+    <dgm:cxn modelId="{A7C24C07-9D42-45D4-8F4A-48EA0593A591}" srcId="{39F36FDB-961B-4E0F-BCAA-557E6B83CA46}" destId="{2966CBF0-8B54-448F-9AC0-1374B3FD34F6}" srcOrd="4" destOrd="0" parTransId="{42D43897-A89B-4DBB-A1A9-13E9B822ABEB}" sibTransId="{C49E696E-028E-40B2-A9F1-AE6356291417}"/>
     <dgm:cxn modelId="{15EFE040-6CCF-4BFC-B54D-458567FD1261}" type="presOf" srcId="{39F36FDB-961B-4E0F-BCAA-557E6B83CA46}" destId="{A0D0C2EB-2E73-4510-871D-D341B645B83B}" srcOrd="0" destOrd="0" presId="urn:microsoft.com/office/officeart/2018/5/layout/IconLeafLabelList"/>
-    <dgm:cxn modelId="{C0550EBA-353A-4E4A-B9ED-C69DCA7913ED}" srcId="{39F36FDB-961B-4E0F-BCAA-557E6B83CA46}" destId="{00EA1226-37A5-4037-AEFB-854198EC0DC6}" srcOrd="5" destOrd="0" parTransId="{D1E7F12A-9C9F-4118-9D26-5C04D2B023A2}" sibTransId="{B33ACB36-DCAD-4CD5-B4D7-BEAF5583F22E}"/>
     <dgm:cxn modelId="{95D5C85B-5606-44FE-B956-F9E2546F7DAA}" srcId="{39F36FDB-961B-4E0F-BCAA-557E6B83CA46}" destId="{08EF9D64-D94D-4082-9224-6D54A131B7E8}" srcOrd="2" destOrd="0" parTransId="{EC5BF98A-A96E-464D-B905-D055C8197C0D}" sibTransId="{BC42980E-4A98-4D7F-98F9-2CADEFF1A1DB}"/>
-    <dgm:cxn modelId="{A7C24C07-9D42-45D4-8F4A-48EA0593A591}" srcId="{39F36FDB-961B-4E0F-BCAA-557E6B83CA46}" destId="{2966CBF0-8B54-448F-9AC0-1374B3FD34F6}" srcOrd="4" destOrd="0" parTransId="{42D43897-A89B-4DBB-A1A9-13E9B822ABEB}" sibTransId="{C49E696E-028E-40B2-A9F1-AE6356291417}"/>
+    <dgm:cxn modelId="{45AFEF4B-1D2F-4377-9B3F-1B0210C6BE4F}" srcId="{39F36FDB-961B-4E0F-BCAA-557E6B83CA46}" destId="{EE56275B-4EE5-4E6F-ACFF-D1D88F402AEF}" srcOrd="6" destOrd="0" parTransId="{76A14493-3473-4B25-BD71-107150CAC77E}" sibTransId="{BAB752CC-1DF4-496B-BFA2-FAFE774B482E}"/>
     <dgm:cxn modelId="{7E0D5F70-8807-4B83-834C-D01E71744FFF}" srcId="{39F36FDB-961B-4E0F-BCAA-557E6B83CA46}" destId="{160558D3-43D9-4983-80B4-144EA09F96BF}" srcOrd="7" destOrd="0" parTransId="{80BBE69F-1ABC-4B8C-B5AB-DF17BAA94179}" sibTransId="{DCE1C09E-9981-4691-BC05-CF01164C8B0F}"/>
-    <dgm:cxn modelId="{D33336D6-3183-48CD-8240-9190D8F52860}" srcId="{39F36FDB-961B-4E0F-BCAA-557E6B83CA46}" destId="{D02C8016-8D26-449E-9AE3-F292FD0EA24F}" srcOrd="1" destOrd="0" parTransId="{B502677F-AF85-402B-9975-189D6F83A834}" sibTransId="{900E401F-DB9B-43A9-868E-AB4B6866ED7C}"/>
-    <dgm:cxn modelId="{913F0A8B-EA90-4C23-B609-CBDB1212AF2C}" srcId="{39F36FDB-961B-4E0F-BCAA-557E6B83CA46}" destId="{7188C3DB-FBD0-46DB-906D-CAF74D9F442B}" srcOrd="3" destOrd="0" parTransId="{B8BED620-43FA-4FB7-8CF8-A9B2BC0CDDCC}" sibTransId="{61E469D9-6D14-491F-8C97-3934588AEEFC}"/>
     <dgm:cxn modelId="{3FFDB771-0464-41A4-9C4C-306058C5E33A}" type="presOf" srcId="{160558D3-43D9-4983-80B4-144EA09F96BF}" destId="{D192A0F9-37C4-4EF0-B3C6-8325F43E0A88}" srcOrd="0" destOrd="0" presId="urn:microsoft.com/office/officeart/2018/5/layout/IconLeafLabelList"/>
     <dgm:cxn modelId="{A81CA673-DA3A-4048-88E5-3BA2888E0B2F}" type="presOf" srcId="{EE56275B-4EE5-4E6F-ACFF-D1D88F402AEF}" destId="{AA64BA03-061B-4B73-AA8B-D0AD6F8E279A}" srcOrd="0" destOrd="0" presId="urn:microsoft.com/office/officeart/2018/5/layout/IconLeafLabelList"/>
+    <dgm:cxn modelId="{FB200678-37BE-414C-A07F-4524CFF9EF75}" type="presOf" srcId="{08EF9D64-D94D-4082-9224-6D54A131B7E8}" destId="{C03389EA-A619-4FAE-BB1F-B635682BAF20}" srcOrd="0" destOrd="0" presId="urn:microsoft.com/office/officeart/2018/5/layout/IconLeafLabelList"/>
+    <dgm:cxn modelId="{86A7C55A-018B-44ED-BE0D-84E8D2B86DBE}" type="presOf" srcId="{2966CBF0-8B54-448F-9AC0-1374B3FD34F6}" destId="{1864A92D-7589-4338-BEBA-07303CDDBF63}" srcOrd="0" destOrd="0" presId="urn:microsoft.com/office/officeart/2018/5/layout/IconLeafLabelList"/>
+    <dgm:cxn modelId="{65576685-7413-44DC-A2DA-5F1A19AF673E}" srcId="{39F36FDB-961B-4E0F-BCAA-557E6B83CA46}" destId="{679D11D8-611E-4F6E-86F9-01C0563FAFB6}" srcOrd="0" destOrd="0" parTransId="{0E4A1188-7E70-4AAD-BF4B-73D90816B2CF}" sibTransId="{FFE1E1A3-83AE-43D6-B5C0-EA8FDE0E1442}"/>
+    <dgm:cxn modelId="{913F0A8B-EA90-4C23-B609-CBDB1212AF2C}" srcId="{39F36FDB-961B-4E0F-BCAA-557E6B83CA46}" destId="{7188C3DB-FBD0-46DB-906D-CAF74D9F442B}" srcOrd="3" destOrd="0" parTransId="{B8BED620-43FA-4FB7-8CF8-A9B2BC0CDDCC}" sibTransId="{61E469D9-6D14-491F-8C97-3934588AEEFC}"/>
+    <dgm:cxn modelId="{FF9F44B4-FA54-4F2E-8115-3D3ACAD5B3D3}" type="presOf" srcId="{D02C8016-8D26-449E-9AE3-F292FD0EA24F}" destId="{AC492AA3-0DA5-4E31-830D-818AAF164180}" srcOrd="0" destOrd="0" presId="urn:microsoft.com/office/officeart/2018/5/layout/IconLeafLabelList"/>
+    <dgm:cxn modelId="{C0550EBA-353A-4E4A-B9ED-C69DCA7913ED}" srcId="{39F36FDB-961B-4E0F-BCAA-557E6B83CA46}" destId="{00EA1226-37A5-4037-AEFB-854198EC0DC6}" srcOrd="5" destOrd="0" parTransId="{D1E7F12A-9C9F-4118-9D26-5C04D2B023A2}" sibTransId="{B33ACB36-DCAD-4CD5-B4D7-BEAF5583F22E}"/>
+    <dgm:cxn modelId="{D33336D6-3183-48CD-8240-9190D8F52860}" srcId="{39F36FDB-961B-4E0F-BCAA-557E6B83CA46}" destId="{D02C8016-8D26-449E-9AE3-F292FD0EA24F}" srcOrd="1" destOrd="0" parTransId="{B502677F-AF85-402B-9975-189D6F83A834}" sibTransId="{900E401F-DB9B-43A9-868E-AB4B6866ED7C}"/>
     <dgm:cxn modelId="{7BBCEBE4-E75F-4B5C-941A-C549EFB40B92}" type="presOf" srcId="{00EA1226-37A5-4037-AEFB-854198EC0DC6}" destId="{6DBA1C58-066B-4A54-810B-A2B847E16118}" srcOrd="0" destOrd="0" presId="urn:microsoft.com/office/officeart/2018/5/layout/IconLeafLabelList"/>
-    <dgm:cxn modelId="{FB200678-37BE-414C-A07F-4524CFF9EF75}" type="presOf" srcId="{08EF9D64-D94D-4082-9224-6D54A131B7E8}" destId="{C03389EA-A619-4FAE-BB1F-B635682BAF20}" srcOrd="0" destOrd="0" presId="urn:microsoft.com/office/officeart/2018/5/layout/IconLeafLabelList"/>
     <dgm:cxn modelId="{C9FF33E5-28F3-4286-AEC5-7420B15BF1E6}" type="presOf" srcId="{7188C3DB-FBD0-46DB-906D-CAF74D9F442B}" destId="{946E7E45-E4B5-46F1-8A2D-37FA870ADE1B}" srcOrd="0" destOrd="0" presId="urn:microsoft.com/office/officeart/2018/5/layout/IconLeafLabelList"/>
-    <dgm:cxn modelId="{65576685-7413-44DC-A2DA-5F1A19AF673E}" srcId="{39F36FDB-961B-4E0F-BCAA-557E6B83CA46}" destId="{679D11D8-611E-4F6E-86F9-01C0563FAFB6}" srcOrd="0" destOrd="0" parTransId="{0E4A1188-7E70-4AAD-BF4B-73D90816B2CF}" sibTransId="{FFE1E1A3-83AE-43D6-B5C0-EA8FDE0E1442}"/>
-    <dgm:cxn modelId="{45AFEF4B-1D2F-4377-9B3F-1B0210C6BE4F}" srcId="{39F36FDB-961B-4E0F-BCAA-557E6B83CA46}" destId="{EE56275B-4EE5-4E6F-ACFF-D1D88F402AEF}" srcOrd="6" destOrd="0" parTransId="{76A14493-3473-4B25-BD71-107150CAC77E}" sibTransId="{BAB752CC-1DF4-496B-BFA2-FAFE774B482E}"/>
-    <dgm:cxn modelId="{86A7C55A-018B-44ED-BE0D-84E8D2B86DBE}" type="presOf" srcId="{2966CBF0-8B54-448F-9AC0-1374B3FD34F6}" destId="{1864A92D-7589-4338-BEBA-07303CDDBF63}" srcOrd="0" destOrd="0" presId="urn:microsoft.com/office/officeart/2018/5/layout/IconLeafLabelList"/>
     <dgm:cxn modelId="{46C8B05C-D55F-40BA-ADDF-8E5539D31BDA}" type="presParOf" srcId="{A0D0C2EB-2E73-4510-871D-D341B645B83B}" destId="{27B221B6-3B4B-4B51-9B9C-619023E7CB81}" srcOrd="0" destOrd="0" presId="urn:microsoft.com/office/officeart/2018/5/layout/IconLeafLabelList"/>
     <dgm:cxn modelId="{EC217133-2244-41E1-A089-59E476B42E96}" type="presParOf" srcId="{27B221B6-3B4B-4B51-9B9C-619023E7CB81}" destId="{238D654D-94F7-439F-921D-64AE29178A06}" srcOrd="0" destOrd="0" presId="urn:microsoft.com/office/officeart/2018/5/layout/IconLeafLabelList"/>
     <dgm:cxn modelId="{FBB045F2-2317-4C9F-89ED-A979C7A62F63}" type="presParOf" srcId="{27B221B6-3B4B-4B51-9B9C-619023E7CB81}" destId="{5D0F820A-649E-47ED-94EC-EE95AC8228CD}" srcOrd="1" destOrd="0" presId="urn:microsoft.com/office/officeart/2018/5/layout/IconLeafLabelList"/>
@@ -1948,7 +1885,7 @@
   <dgm:whole/>
   <dgm:extLst>
     <a:ext uri="http://schemas.microsoft.com/office/drawing/2008/diagram">
-      <dsp:dataModelExt xmlns:dsp="http://schemas.microsoft.com/office/drawing/2008/diagram" xmlns="" relId="rId6" minVer="http://schemas.openxmlformats.org/drawingml/2006/diagram"/>
+      <dsp:dataModelExt xmlns:dsp="http://schemas.microsoft.com/office/drawing/2008/diagram" relId="rId6" minVer="http://schemas.openxmlformats.org/drawingml/2006/diagram"/>
     </a:ext>
   </dgm:extLst>
 </dgm:dataModel>
@@ -8438,10 +8375,6 @@
           </a:bodyPr>
           <a:lstStyle/>
           <a:p>
-            <a:r>
-              <a:rPr lang="en-US" dirty="0"/>
-              <a:t/>
-            </a:r>
             <a:br>
               <a:rPr lang="en-US" dirty="0"/>
             </a:br>
@@ -8843,7 +8776,7 @@
           <a:blip r:embed="rId2">
             <a:extLst>
               <a:ext uri="{28A0092B-C50C-407E-A947-70E740481C1C}">
-                <a14:useLocalDpi xmlns:a14="http://schemas.microsoft.com/office/drawing/2010/main" xmlns="" val="0"/>
+                <a14:useLocalDpi xmlns:a14="http://schemas.microsoft.com/office/drawing/2010/main" val="0"/>
               </a:ext>
             </a:extLst>
           </a:blip>
@@ -9074,7 +9007,7 @@
           <p:cNvPr id="2" name="Title 1">
             <a:extLst>
               <a:ext uri="{FF2B5EF4-FFF2-40B4-BE49-F238E27FC236}">
-                <a16:creationId xmlns:a16="http://schemas.microsoft.com/office/drawing/2014/main" xmlns="" id="{D382C1D4-141A-A0C3-F686-3FB45C999E06}"/>
+                <a16:creationId xmlns:a16="http://schemas.microsoft.com/office/drawing/2014/main" id="{D382C1D4-141A-A0C3-F686-3FB45C999E06}"/>
               </a:ext>
             </a:extLst>
           </p:cNvPr>
@@ -9104,7 +9037,7 @@
           <p:cNvPr id="3" name="Content Placeholder 2">
             <a:extLst>
               <a:ext uri="{FF2B5EF4-FFF2-40B4-BE49-F238E27FC236}">
-                <a16:creationId xmlns:a16="http://schemas.microsoft.com/office/drawing/2014/main" xmlns="" id="{DB132533-4A3A-18ED-D025-85EA09B0DE37}"/>
+                <a16:creationId xmlns:a16="http://schemas.microsoft.com/office/drawing/2014/main" id="{DB132533-4A3A-18ED-D025-85EA09B0DE37}"/>
               </a:ext>
             </a:extLst>
           </p:cNvPr>
@@ -9181,7 +9114,7 @@
     </p:spTree>
     <p:extLst>
       <p:ext uri="{BB962C8B-B14F-4D97-AF65-F5344CB8AC3E}">
-        <p14:creationId xmlns:p14="http://schemas.microsoft.com/office/powerpoint/2010/main" xmlns="" val="3770612993"/>
+        <p14:creationId xmlns:p14="http://schemas.microsoft.com/office/powerpoint/2010/main" val="3770612993"/>
       </p:ext>
     </p:extLst>
   </p:cSld>
@@ -9226,18 +9159,13 @@
           <a:lstStyle/>
           <a:p>
             <a:r>
-              <a:rPr lang="en-US" sz="3600" b="1" dirty="0" smtClean="0">
+              <a:rPr lang="en-US" sz="3600" b="1" dirty="0">
                 <a:solidFill>
                   <a:schemeClr val="tx1"/>
                 </a:solidFill>
               </a:rPr>
               <a:t>Result</a:t>
             </a:r>
-            <a:endParaRPr lang="en-US" sz="3600" b="1" dirty="0">
-              <a:solidFill>
-                <a:schemeClr val="tx1"/>
-              </a:solidFill>
-            </a:endParaRPr>
           </a:p>
         </p:txBody>
       </p:sp>
@@ -9251,7 +9179,12 @@
             <p:ph idx="1"/>
           </p:nvPr>
         </p:nvSpPr>
-        <p:spPr/>
+        <p:spPr>
+          <a:xfrm>
+            <a:off x="822959" y="1905000"/>
+            <a:ext cx="7543801" cy="4023360"/>
+          </a:xfrm>
+        </p:spPr>
         <p:txBody>
           <a:bodyPr/>
           <a:lstStyle/>
@@ -9263,7 +9196,38 @@
                 <a:latin typeface="Times New Roman" panose="02020603050405020304" pitchFamily="18" charset="0"/>
                 <a:ea typeface="SimSun" panose="02010600030101010101" pitchFamily="2" charset="-122"/>
               </a:rPr>
-              <a:t>The CNN model is trained against the MNIST dataset, where 27455 are training samples and 784 train features. Cross-entropy ADAM is used for the model to reduce loss. 512 batches of 50 epochs each are used to train the model, which has a 0.001 learning rate. The accuracy of the validation dataset, which has 7172 samples, is 97%. </a:t>
+              <a:t>The CNN model is trained </a:t>
+            </a:r>
+            <a:r>
+              <a:rPr lang="en-US" sz="1800" dirty="0">
+                <a:latin typeface="Times New Roman" panose="02020603050405020304" pitchFamily="18" charset="0"/>
+                <a:ea typeface="SimSun" panose="02010600030101010101" pitchFamily="2" charset="-122"/>
+              </a:rPr>
+              <a:t>with </a:t>
+            </a:r>
+            <a:r>
+              <a:rPr lang="en-US" sz="1800" dirty="0">
+                <a:effectLst/>
+                <a:latin typeface="Times New Roman" panose="02020603050405020304" pitchFamily="18" charset="0"/>
+                <a:ea typeface="SimSun" panose="02010600030101010101" pitchFamily="2" charset="-122"/>
+              </a:rPr>
+              <a:t>50 epochs with 0.001 learning rate. The accuracy of the </a:t>
+            </a:r>
+            <a:r>
+              <a:rPr lang="en-US" sz="1800">
+                <a:effectLst/>
+                <a:latin typeface="Times New Roman" panose="02020603050405020304" pitchFamily="18" charset="0"/>
+                <a:ea typeface="SimSun" panose="02010600030101010101" pitchFamily="2" charset="-122"/>
+              </a:rPr>
+              <a:t>validation dataset is </a:t>
+            </a:r>
+            <a:r>
+              <a:rPr lang="en-US" sz="1800" dirty="0">
+                <a:effectLst/>
+                <a:latin typeface="Times New Roman" panose="02020603050405020304" pitchFamily="18" charset="0"/>
+                <a:ea typeface="SimSun" panose="02010600030101010101" pitchFamily="2" charset="-122"/>
+              </a:rPr>
+              <a:t>97%. </a:t>
             </a:r>
             <a:endParaRPr lang="en-IN" dirty="0"/>
           </a:p>
@@ -9407,7 +9371,7 @@
           <p:cNvPr id="2" name="Title 1">
             <a:extLst>
               <a:ext uri="{FF2B5EF4-FFF2-40B4-BE49-F238E27FC236}">
-                <a16:creationId xmlns:a16="http://schemas.microsoft.com/office/drawing/2014/main" xmlns="" id="{526EB6A4-100E-3D6E-1246-0FD65D775283}"/>
+                <a16:creationId xmlns:a16="http://schemas.microsoft.com/office/drawing/2014/main" id="{526EB6A4-100E-3D6E-1246-0FD65D775283}"/>
               </a:ext>
             </a:extLst>
           </p:cNvPr>
@@ -9443,7 +9407,7 @@
           <p:cNvPr id="3" name="Content Placeholder 2">
             <a:extLst>
               <a:ext uri="{FF2B5EF4-FFF2-40B4-BE49-F238E27FC236}">
-                <a16:creationId xmlns:a16="http://schemas.microsoft.com/office/drawing/2014/main" xmlns="" id="{7F973009-45FC-3F3C-89EB-F16437B93E69}"/>
+                <a16:creationId xmlns:a16="http://schemas.microsoft.com/office/drawing/2014/main" id="{7F973009-45FC-3F3C-89EB-F16437B93E69}"/>
               </a:ext>
             </a:extLst>
           </p:cNvPr>
@@ -9500,7 +9464,7 @@
           <p:cNvPr id="5" name="Picture 4">
             <a:extLst>
               <a:ext uri="{FF2B5EF4-FFF2-40B4-BE49-F238E27FC236}">
-                <a16:creationId xmlns:a16="http://schemas.microsoft.com/office/drawing/2014/main" xmlns="" id="{271CBEA9-6994-A5C1-6DCE-E7BE45A345CA}"/>
+                <a16:creationId xmlns:a16="http://schemas.microsoft.com/office/drawing/2014/main" id="{271CBEA9-6994-A5C1-6DCE-E7BE45A345CA}"/>
               </a:ext>
             </a:extLst>
           </p:cNvPr>
@@ -9513,7 +9477,7 @@
           <a:blip r:embed="rId2">
             <a:extLst>
               <a:ext uri="{28A0092B-C50C-407E-A947-70E740481C1C}">
-                <a14:useLocalDpi xmlns:a14="http://schemas.microsoft.com/office/drawing/2010/main" xmlns="" val="0"/>
+                <a14:useLocalDpi xmlns:a14="http://schemas.microsoft.com/office/drawing/2010/main" val="0"/>
               </a:ext>
             </a:extLst>
           </a:blip>
@@ -9534,7 +9498,7 @@
     </p:spTree>
     <p:extLst>
       <p:ext uri="{BB962C8B-B14F-4D97-AF65-F5344CB8AC3E}">
-        <p14:creationId xmlns:p14="http://schemas.microsoft.com/office/powerpoint/2010/main" xmlns="" val="2996623362"/>
+        <p14:creationId xmlns:p14="http://schemas.microsoft.com/office/powerpoint/2010/main" val="2996623362"/>
       </p:ext>
     </p:extLst>
   </p:cSld>
@@ -9584,10 +9548,9 @@
           <a:lstStyle/>
           <a:p>
             <a:r>
-              <a:rPr lang="en-US" sz="3600" b="1" dirty="0" smtClean="0"/>
+              <a:rPr lang="en-US" sz="3600" b="1" dirty="0"/>
               <a:t>Conclusion</a:t>
             </a:r>
-            <a:endParaRPr lang="en-US" sz="3600" b="1" dirty="0"/>
           </a:p>
         </p:txBody>
       </p:sp>
@@ -9613,26 +9576,17 @@
           <a:p>
             <a:pPr algn="just"/>
             <a:r>
-              <a:rPr lang="en-US" dirty="0" smtClean="0"/>
+              <a:rPr lang="en-US" dirty="0"/>
               <a:t>This paper presents a CNN-based method for </a:t>
             </a:r>
             <a:r>
-              <a:rPr lang="en-US" dirty="0" err="1" smtClean="0"/>
+              <a:rPr lang="en-US" dirty="0" err="1"/>
               <a:t>recognising</a:t>
             </a:r>
             <a:r>
-              <a:rPr lang="en-US" dirty="0" smtClean="0"/>
-              <a:t> and classifying sign language </a:t>
-            </a:r>
-            <a:r>
-              <a:rPr lang="en-US" dirty="0" smtClean="0"/>
-              <a:t>using computer </a:t>
-            </a:r>
-            <a:r>
-              <a:rPr lang="en-US" dirty="0" smtClean="0"/>
-              <a:t>vision. Unlike other approaches, this method yields higher precision than [10].</a:t>
-            </a:r>
-            <a:endParaRPr lang="en-US" dirty="0"/>
+              <a:rPr lang="en-US" dirty="0"/>
+              <a:t> and classifying sign language using computer vision. Unlike other approaches, this method yields higher precision than [10].</a:t>
+            </a:r>
           </a:p>
         </p:txBody>
       </p:sp>
@@ -9655,9 +9609,27 @@
                 <a:tableStyleId>{5C22544A-7EE6-4342-B048-85BDC9FD1C3A}</a:tableStyleId>
               </a:tblPr>
               <a:tblGrid>
-                <a:gridCol w="2311400"/>
-                <a:gridCol w="2311400"/>
-                <a:gridCol w="2311400"/>
+                <a:gridCol w="2311400">
+                  <a:extLst>
+                    <a:ext uri="{9D8B030D-6E8A-4147-A177-3AD203B41FA5}">
+                      <a16:colId xmlns:a16="http://schemas.microsoft.com/office/drawing/2014/main" val="20000"/>
+                    </a:ext>
+                  </a:extLst>
+                </a:gridCol>
+                <a:gridCol w="2311400">
+                  <a:extLst>
+                    <a:ext uri="{9D8B030D-6E8A-4147-A177-3AD203B41FA5}">
+                      <a16:colId xmlns:a16="http://schemas.microsoft.com/office/drawing/2014/main" val="20001"/>
+                    </a:ext>
+                  </a:extLst>
+                </a:gridCol>
+                <a:gridCol w="2311400">
+                  <a:extLst>
+                    <a:ext uri="{9D8B030D-6E8A-4147-A177-3AD203B41FA5}">
+                      <a16:colId xmlns:a16="http://schemas.microsoft.com/office/drawing/2014/main" val="20002"/>
+                    </a:ext>
+                  </a:extLst>
+                </a:gridCol>
               </a:tblGrid>
               <a:tr h="424768">
                 <a:tc>
@@ -9676,10 +9648,9 @@
                     <a:lstStyle/>
                     <a:p>
                       <a:r>
-                        <a:rPr lang="en-US" dirty="0" smtClean="0"/>
+                        <a:rPr lang="en-US" dirty="0"/>
                         <a:t>Our Model</a:t>
                       </a:r>
-                      <a:endParaRPr lang="en-US" dirty="0"/>
                     </a:p>
                   </a:txBody>
                   <a:tcPr/>
@@ -9690,14 +9661,18 @@
                     <a:lstStyle/>
                     <a:p>
                       <a:r>
-                        <a:rPr lang="en-US" dirty="0" smtClean="0"/>
+                        <a:rPr lang="en-US" dirty="0"/>
                         <a:t>Ref[10]</a:t>
                       </a:r>
-                      <a:endParaRPr lang="en-US" dirty="0"/>
                     </a:p>
                   </a:txBody>
                   <a:tcPr/>
                 </a:tc>
+                <a:extLst>
+                  <a:ext uri="{0D108BD9-81ED-4DB2-BD59-A6C34878D82A}">
+                    <a16:rowId xmlns:a16="http://schemas.microsoft.com/office/drawing/2014/main" val="10000"/>
+                  </a:ext>
+                </a:extLst>
               </a:tr>
               <a:tr h="257604">
                 <a:tc>
@@ -9706,10 +9681,9 @@
                     <a:lstStyle/>
                     <a:p>
                       <a:r>
-                        <a:rPr lang="en-US" dirty="0" smtClean="0"/>
+                        <a:rPr lang="en-US" dirty="0"/>
                         <a:t>Year</a:t>
                       </a:r>
-                      <a:endParaRPr lang="en-US" dirty="0"/>
                     </a:p>
                   </a:txBody>
                   <a:tcPr/>
@@ -9720,10 +9694,9 @@
                     <a:lstStyle/>
                     <a:p>
                       <a:r>
-                        <a:rPr lang="en-US" dirty="0" smtClean="0"/>
+                        <a:rPr lang="en-US" dirty="0"/>
                         <a:t>2023</a:t>
                       </a:r>
-                      <a:endParaRPr lang="en-US" dirty="0"/>
                     </a:p>
                   </a:txBody>
                   <a:tcPr/>
@@ -9734,14 +9707,18 @@
                     <a:lstStyle/>
                     <a:p>
                       <a:r>
-                        <a:rPr lang="en-US" dirty="0" smtClean="0"/>
+                        <a:rPr lang="en-US" dirty="0"/>
                         <a:t>2020</a:t>
                       </a:r>
-                      <a:endParaRPr lang="en-US" dirty="0"/>
                     </a:p>
                   </a:txBody>
                   <a:tcPr/>
                 </a:tc>
+                <a:extLst>
+                  <a:ext uri="{0D108BD9-81ED-4DB2-BD59-A6C34878D82A}">
+                    <a16:rowId xmlns:a16="http://schemas.microsoft.com/office/drawing/2014/main" val="10001"/>
+                  </a:ext>
+                </a:extLst>
               </a:tr>
               <a:tr h="1803225">
                 <a:tc>
@@ -9750,10 +9727,9 @@
                     <a:lstStyle/>
                     <a:p>
                       <a:r>
-                        <a:rPr lang="en-US" dirty="0" smtClean="0"/>
+                        <a:rPr lang="en-US" dirty="0"/>
                         <a:t>Model</a:t>
                       </a:r>
-                      <a:endParaRPr lang="en-US" dirty="0"/>
                     </a:p>
                   </a:txBody>
                   <a:tcPr/>
@@ -9764,26 +9740,25 @@
                     <a:lstStyle/>
                     <a:p>
                       <a:r>
-                        <a:rPr lang="en-US" dirty="0" smtClean="0"/>
+                        <a:rPr lang="en-US" dirty="0"/>
                         <a:t>The CNN model developed consists of 15 different layer, three </a:t>
                       </a:r>
                       <a:r>
-                        <a:rPr lang="en-US" dirty="0" err="1" smtClean="0"/>
+                        <a:rPr lang="en-US" dirty="0" err="1"/>
                         <a:t>convolutional</a:t>
                       </a:r>
                       <a:r>
-                        <a:rPr lang="en-US" dirty="0" smtClean="0"/>
+                        <a:rPr lang="en-US" dirty="0"/>
                         <a:t> layer, two pooling (Max) layer,</a:t>
                       </a:r>
                       <a:r>
-                        <a:rPr lang="en-US" baseline="0" dirty="0" smtClean="0"/>
+                        <a:rPr lang="en-US" baseline="0" dirty="0"/>
                         <a:t> t</a:t>
                       </a:r>
                       <a:r>
-                        <a:rPr lang="en-US" dirty="0" smtClean="0"/>
+                        <a:rPr lang="en-US" dirty="0"/>
                         <a:t>en dense connected layer</a:t>
                       </a:r>
-                      <a:endParaRPr lang="en-US" dirty="0"/>
                     </a:p>
                   </a:txBody>
                   <a:tcPr/>
@@ -9794,30 +9769,34 @@
                     <a:lstStyle/>
                     <a:p>
                       <a:r>
-                        <a:rPr lang="en-US" dirty="0" smtClean="0"/>
+                        <a:rPr lang="en-US" dirty="0"/>
                         <a:t>The CNN model developed consists of 11 different layer, four </a:t>
                       </a:r>
                       <a:r>
-                        <a:rPr lang="en-US" dirty="0" err="1" smtClean="0"/>
+                        <a:rPr lang="en-US" dirty="0" err="1"/>
                         <a:t>convolutional</a:t>
                       </a:r>
                       <a:r>
-                        <a:rPr lang="en-US" dirty="0" smtClean="0"/>
+                        <a:rPr lang="en-US" dirty="0"/>
                         <a:t> layer, three Pooling (Max) layer,</a:t>
                       </a:r>
                       <a:r>
-                        <a:rPr lang="en-US" baseline="0" dirty="0" smtClean="0"/>
+                        <a:rPr lang="en-US" baseline="0" dirty="0"/>
                         <a:t> t</a:t>
                       </a:r>
                       <a:r>
-                        <a:rPr lang="en-US" dirty="0" smtClean="0"/>
+                        <a:rPr lang="en-US" dirty="0"/>
                         <a:t>wo dense Connected, one flatten and one dropout layer.</a:t>
                       </a:r>
-                      <a:endParaRPr lang="en-US" dirty="0"/>
                     </a:p>
                   </a:txBody>
                   <a:tcPr/>
                 </a:tc>
+                <a:extLst>
+                  <a:ext uri="{0D108BD9-81ED-4DB2-BD59-A6C34878D82A}">
+                    <a16:rowId xmlns:a16="http://schemas.microsoft.com/office/drawing/2014/main" val="10002"/>
+                  </a:ext>
+                </a:extLst>
               </a:tr>
               <a:tr h="257604">
                 <a:tc>
@@ -9826,10 +9805,9 @@
                     <a:lstStyle/>
                     <a:p>
                       <a:r>
-                        <a:rPr lang="en-US" dirty="0" smtClean="0"/>
+                        <a:rPr lang="en-US" dirty="0"/>
                         <a:t>Accuracy</a:t>
                       </a:r>
-                      <a:endParaRPr lang="en-US" dirty="0"/>
                     </a:p>
                   </a:txBody>
                   <a:tcPr/>
@@ -9840,10 +9818,9 @@
                     <a:lstStyle/>
                     <a:p>
                       <a:r>
-                        <a:rPr lang="en-US" dirty="0" smtClean="0"/>
+                        <a:rPr lang="en-US" dirty="0"/>
                         <a:t>96.89</a:t>
                       </a:r>
-                      <a:endParaRPr lang="en-US" dirty="0"/>
                     </a:p>
                   </a:txBody>
                   <a:tcPr/>
@@ -9854,14 +9831,18 @@
                     <a:lstStyle/>
                     <a:p>
                       <a:r>
-                        <a:rPr lang="en-US" dirty="0" smtClean="0"/>
+                        <a:rPr lang="en-US" dirty="0"/>
                         <a:t>93%</a:t>
                       </a:r>
-                      <a:endParaRPr lang="en-US" dirty="0"/>
                     </a:p>
                   </a:txBody>
                   <a:tcPr/>
                 </a:tc>
+                <a:extLst>
+                  <a:ext uri="{0D108BD9-81ED-4DB2-BD59-A6C34878D82A}">
+                    <a16:rowId xmlns:a16="http://schemas.microsoft.com/office/drawing/2014/main" val="10003"/>
+                  </a:ext>
+                </a:extLst>
               </a:tr>
             </a:tbl>
           </a:graphicData>
@@ -11547,7 +11528,7 @@
           <a:blip r:embed="rId2" cstate="print">
             <a:extLst>
               <a:ext uri="{28A0092B-C50C-407E-A947-70E740481C1C}">
-                <a14:useLocalDpi xmlns:a14="http://schemas.microsoft.com/office/drawing/2010/main" xmlns="" val="0"/>
+                <a14:useLocalDpi xmlns:a14="http://schemas.microsoft.com/office/drawing/2010/main" val="0"/>
               </a:ext>
             </a:extLst>
           </a:blip>
@@ -11804,7 +11785,7 @@
           <a:blip r:embed="rId2" cstate="print">
             <a:extLst>
               <a:ext uri="{28A0092B-C50C-407E-A947-70E740481C1C}">
-                <a14:useLocalDpi xmlns:a14="http://schemas.microsoft.com/office/drawing/2010/main" xmlns="" val="0"/>
+                <a14:useLocalDpi xmlns:a14="http://schemas.microsoft.com/office/drawing/2010/main" val="0"/>
               </a:ext>
             </a:extLst>
           </a:blip>
@@ -12357,35 +12338,35 @@
                 <a:gridCol w="1880270">
                   <a:extLst>
                     <a:ext uri="{9D8B030D-6E8A-4147-A177-3AD203B41FA5}">
-                      <a16:colId xmlns:a16="http://schemas.microsoft.com/office/drawing/2014/main" xmlns="" val="20000"/>
+                      <a16:colId xmlns:a16="http://schemas.microsoft.com/office/drawing/2014/main" val="20000"/>
                     </a:ext>
                   </a:extLst>
                 </a:gridCol>
                 <a:gridCol w="1556757">
                   <a:extLst>
                     <a:ext uri="{9D8B030D-6E8A-4147-A177-3AD203B41FA5}">
-                      <a16:colId xmlns:a16="http://schemas.microsoft.com/office/drawing/2014/main" xmlns="" val="20001"/>
+                      <a16:colId xmlns:a16="http://schemas.microsoft.com/office/drawing/2014/main" val="20001"/>
                     </a:ext>
                   </a:extLst>
                 </a:gridCol>
                 <a:gridCol w="1995149">
                   <a:extLst>
                     <a:ext uri="{9D8B030D-6E8A-4147-A177-3AD203B41FA5}">
-                      <a16:colId xmlns:a16="http://schemas.microsoft.com/office/drawing/2014/main" xmlns="" val="20002"/>
+                      <a16:colId xmlns:a16="http://schemas.microsoft.com/office/drawing/2014/main" val="20002"/>
                     </a:ext>
                   </a:extLst>
                 </a:gridCol>
                 <a:gridCol w="1730626">
                   <a:extLst>
                     <a:ext uri="{9D8B030D-6E8A-4147-A177-3AD203B41FA5}">
-                      <a16:colId xmlns:a16="http://schemas.microsoft.com/office/drawing/2014/main" xmlns="" val="20003"/>
+                      <a16:colId xmlns:a16="http://schemas.microsoft.com/office/drawing/2014/main" val="20003"/>
                     </a:ext>
                   </a:extLst>
                 </a:gridCol>
                 <a:gridCol w="1142999">
                   <a:extLst>
                     <a:ext uri="{9D8B030D-6E8A-4147-A177-3AD203B41FA5}">
-                      <a16:colId xmlns:a16="http://schemas.microsoft.com/office/drawing/2014/main" xmlns="" val="20004"/>
+                      <a16:colId xmlns:a16="http://schemas.microsoft.com/office/drawing/2014/main" val="20004"/>
                     </a:ext>
                   </a:extLst>
                 </a:gridCol>
@@ -12548,7 +12529,7 @@
                 </a:tc>
                 <a:extLst>
                   <a:ext uri="{0D108BD9-81ED-4DB2-BD59-A6C34878D82A}">
-                    <a16:rowId xmlns:a16="http://schemas.microsoft.com/office/drawing/2014/main" xmlns="" val="10000"/>
+                    <a16:rowId xmlns:a16="http://schemas.microsoft.com/office/drawing/2014/main" val="10000"/>
                   </a:ext>
                 </a:extLst>
               </a:tr>
@@ -12722,7 +12703,7 @@
                 </a:tc>
                 <a:extLst>
                   <a:ext uri="{0D108BD9-81ED-4DB2-BD59-A6C34878D82A}">
-                    <a16:rowId xmlns:a16="http://schemas.microsoft.com/office/drawing/2014/main" xmlns="" val="10001"/>
+                    <a16:rowId xmlns:a16="http://schemas.microsoft.com/office/drawing/2014/main" val="10001"/>
                   </a:ext>
                 </a:extLst>
               </a:tr>
@@ -12920,7 +12901,7 @@
                 </a:tc>
                 <a:extLst>
                   <a:ext uri="{0D108BD9-81ED-4DB2-BD59-A6C34878D82A}">
-                    <a16:rowId xmlns:a16="http://schemas.microsoft.com/office/drawing/2014/main" xmlns="" val="10002"/>
+                    <a16:rowId xmlns:a16="http://schemas.microsoft.com/office/drawing/2014/main" val="10002"/>
                   </a:ext>
                 </a:extLst>
               </a:tr>
@@ -13106,7 +13087,7 @@
                 </a:tc>
                 <a:extLst>
                   <a:ext uri="{0D108BD9-81ED-4DB2-BD59-A6C34878D82A}">
-                    <a16:rowId xmlns:a16="http://schemas.microsoft.com/office/drawing/2014/main" xmlns="" val="10003"/>
+                    <a16:rowId xmlns:a16="http://schemas.microsoft.com/office/drawing/2014/main" val="10003"/>
                   </a:ext>
                 </a:extLst>
               </a:tr>
@@ -13268,7 +13249,7 @@
                 </a:tc>
                 <a:extLst>
                   <a:ext uri="{0D108BD9-81ED-4DB2-BD59-A6C34878D82A}">
-                    <a16:rowId xmlns:a16="http://schemas.microsoft.com/office/drawing/2014/main" xmlns="" val="10004"/>
+                    <a16:rowId xmlns:a16="http://schemas.microsoft.com/office/drawing/2014/main" val="10004"/>
                   </a:ext>
                 </a:extLst>
               </a:tr>
@@ -13323,35 +13304,35 @@
                 <a:gridCol w="1766720">
                   <a:extLst>
                     <a:ext uri="{9D8B030D-6E8A-4147-A177-3AD203B41FA5}">
-                      <a16:colId xmlns:a16="http://schemas.microsoft.com/office/drawing/2014/main" xmlns="" val="20000"/>
+                      <a16:colId xmlns:a16="http://schemas.microsoft.com/office/drawing/2014/main" val="20000"/>
                     </a:ext>
                   </a:extLst>
                 </a:gridCol>
                 <a:gridCol w="1357480">
                   <a:extLst>
                     <a:ext uri="{9D8B030D-6E8A-4147-A177-3AD203B41FA5}">
-                      <a16:colId xmlns:a16="http://schemas.microsoft.com/office/drawing/2014/main" xmlns="" val="20001"/>
+                      <a16:colId xmlns:a16="http://schemas.microsoft.com/office/drawing/2014/main" val="20001"/>
                     </a:ext>
                   </a:extLst>
                 </a:gridCol>
                 <a:gridCol w="1835977">
                   <a:extLst>
                     <a:ext uri="{9D8B030D-6E8A-4147-A177-3AD203B41FA5}">
-                      <a16:colId xmlns:a16="http://schemas.microsoft.com/office/drawing/2014/main" xmlns="" val="20002"/>
+                      <a16:colId xmlns:a16="http://schemas.microsoft.com/office/drawing/2014/main" val="20002"/>
                     </a:ext>
                   </a:extLst>
                 </a:gridCol>
                 <a:gridCol w="1614575">
                   <a:extLst>
                     <a:ext uri="{9D8B030D-6E8A-4147-A177-3AD203B41FA5}">
-                      <a16:colId xmlns:a16="http://schemas.microsoft.com/office/drawing/2014/main" xmlns="" val="20003"/>
+                      <a16:colId xmlns:a16="http://schemas.microsoft.com/office/drawing/2014/main" val="20003"/>
                     </a:ext>
                   </a:extLst>
                 </a:gridCol>
                 <a:gridCol w="969048">
                   <a:extLst>
                     <a:ext uri="{9D8B030D-6E8A-4147-A177-3AD203B41FA5}">
-                      <a16:colId xmlns:a16="http://schemas.microsoft.com/office/drawing/2014/main" xmlns="" val="20004"/>
+                      <a16:colId xmlns:a16="http://schemas.microsoft.com/office/drawing/2014/main" val="20004"/>
                     </a:ext>
                   </a:extLst>
                 </a:gridCol>
@@ -13754,7 +13735,7 @@
                 </a:tc>
                 <a:extLst>
                   <a:ext uri="{0D108BD9-81ED-4DB2-BD59-A6C34878D82A}">
-                    <a16:rowId xmlns:a16="http://schemas.microsoft.com/office/drawing/2014/main" xmlns="" val="10000"/>
+                    <a16:rowId xmlns:a16="http://schemas.microsoft.com/office/drawing/2014/main" val="10000"/>
                   </a:ext>
                 </a:extLst>
               </a:tr>
@@ -14130,7 +14111,7 @@
                 </a:tc>
                 <a:extLst>
                   <a:ext uri="{0D108BD9-81ED-4DB2-BD59-A6C34878D82A}">
-                    <a16:rowId xmlns:a16="http://schemas.microsoft.com/office/drawing/2014/main" xmlns="" val="10001"/>
+                    <a16:rowId xmlns:a16="http://schemas.microsoft.com/office/drawing/2014/main" val="10001"/>
                   </a:ext>
                 </a:extLst>
               </a:tr>
@@ -14532,7 +14513,7 @@
                 </a:tc>
                 <a:extLst>
                   <a:ext uri="{0D108BD9-81ED-4DB2-BD59-A6C34878D82A}">
-                    <a16:rowId xmlns:a16="http://schemas.microsoft.com/office/drawing/2014/main" xmlns="" val="10002"/>
+                    <a16:rowId xmlns:a16="http://schemas.microsoft.com/office/drawing/2014/main" val="10002"/>
                   </a:ext>
                 </a:extLst>
               </a:tr>
@@ -14928,7 +14909,7 @@
                 </a:tc>
                 <a:extLst>
                   <a:ext uri="{0D108BD9-81ED-4DB2-BD59-A6C34878D82A}">
-                    <a16:rowId xmlns:a16="http://schemas.microsoft.com/office/drawing/2014/main" xmlns="" val="10003"/>
+                    <a16:rowId xmlns:a16="http://schemas.microsoft.com/office/drawing/2014/main" val="10003"/>
                   </a:ext>
                 </a:extLst>
               </a:tr>
@@ -15045,15 +15026,6 @@
           </a:bodyPr>
           <a:lstStyle/>
           <a:p>
-            <a:r>
-              <a:rPr lang="en-IN" sz="1800" b="0" i="0" u="none" strike="noStrike" baseline="0" dirty="0">
-                <a:solidFill>
-                  <a:srgbClr val="000000"/>
-                </a:solidFill>
-                <a:latin typeface="Red Hat Display"/>
-              </a:rPr>
-              <a:t/>
-            </a:r>
             <a:br>
               <a:rPr lang="en-IN" sz="1800" b="0" i="0" u="none" strike="noStrike" baseline="0" dirty="0">
                 <a:solidFill>
@@ -15062,15 +15034,6 @@
                 <a:latin typeface="Red Hat Display"/>
               </a:rPr>
             </a:br>
-            <a:r>
-              <a:rPr lang="en-IN" sz="1800" b="0" i="0" u="none" strike="noStrike" baseline="0" dirty="0">
-                <a:solidFill>
-                  <a:srgbClr val="000000"/>
-                </a:solidFill>
-                <a:latin typeface="Red Hat Display"/>
-              </a:rPr>
-              <a:t/>
-            </a:r>
             <a:br>
               <a:rPr lang="en-IN" sz="1800" b="0" i="0" u="none" strike="noStrike" baseline="0" dirty="0">
                 <a:solidFill>
@@ -15079,15 +15042,6 @@
                 <a:latin typeface="Red Hat Display"/>
               </a:rPr>
             </a:br>
-            <a:r>
-              <a:rPr lang="en-IN" sz="1800" b="0" i="0" u="none" strike="noStrike" baseline="0" dirty="0">
-                <a:solidFill>
-                  <a:srgbClr val="000000"/>
-                </a:solidFill>
-                <a:latin typeface="Red Hat Display"/>
-              </a:rPr>
-              <a:t/>
-            </a:r>
             <a:br>
               <a:rPr lang="en-IN" sz="1800" b="0" i="0" u="none" strike="noStrike" baseline="0" dirty="0">
                 <a:solidFill>
@@ -15096,15 +15050,6 @@
                 <a:latin typeface="Red Hat Display"/>
               </a:rPr>
             </a:br>
-            <a:r>
-              <a:rPr lang="en-IN" sz="1800" b="0" i="0" u="none" strike="noStrike" baseline="0" dirty="0">
-                <a:solidFill>
-                  <a:srgbClr val="000000"/>
-                </a:solidFill>
-                <a:latin typeface="Red Hat Display"/>
-              </a:rPr>
-              <a:t/>
-            </a:r>
             <a:br>
               <a:rPr lang="en-IN" sz="1800" b="0" i="0" u="none" strike="noStrike" baseline="0" dirty="0">
                 <a:solidFill>
@@ -15113,15 +15058,6 @@
                 <a:latin typeface="Red Hat Display"/>
               </a:rPr>
             </a:br>
-            <a:r>
-              <a:rPr lang="en-IN" sz="1800" b="0" i="0" u="none" strike="noStrike" baseline="0" dirty="0">
-                <a:solidFill>
-                  <a:srgbClr val="000000"/>
-                </a:solidFill>
-                <a:latin typeface="Red Hat Display"/>
-              </a:rPr>
-              <a:t/>
-            </a:r>
             <a:br>
               <a:rPr lang="en-IN" sz="1800" b="0" i="0" u="none" strike="noStrike" baseline="0" dirty="0">
                 <a:solidFill>
@@ -15130,15 +15066,6 @@
                 <a:latin typeface="Red Hat Display"/>
               </a:rPr>
             </a:br>
-            <a:r>
-              <a:rPr lang="en-IN" sz="1800" b="0" i="0" u="none" strike="noStrike" baseline="0" dirty="0">
-                <a:solidFill>
-                  <a:srgbClr val="000000"/>
-                </a:solidFill>
-                <a:latin typeface="Red Hat Display"/>
-              </a:rPr>
-              <a:t/>
-            </a:r>
             <a:br>
               <a:rPr lang="en-IN" sz="1800" b="0" i="0" u="none" strike="noStrike" baseline="0" dirty="0">
                 <a:solidFill>
@@ -15147,15 +15074,6 @@
                 <a:latin typeface="Red Hat Display"/>
               </a:rPr>
             </a:br>
-            <a:r>
-              <a:rPr lang="en-IN" sz="1800" b="0" i="0" u="none" strike="noStrike" baseline="0" dirty="0">
-                <a:solidFill>
-                  <a:srgbClr val="000000"/>
-                </a:solidFill>
-                <a:latin typeface="Red Hat Display"/>
-              </a:rPr>
-              <a:t/>
-            </a:r>
             <a:br>
               <a:rPr lang="en-IN" sz="1800" b="0" i="0" u="none" strike="noStrike" baseline="0" dirty="0">
                 <a:solidFill>
@@ -15164,15 +15082,6 @@
                 <a:latin typeface="Red Hat Display"/>
               </a:rPr>
             </a:br>
-            <a:r>
-              <a:rPr lang="en-IN" sz="1800" b="0" i="0" u="none" strike="noStrike" baseline="0" dirty="0">
-                <a:solidFill>
-                  <a:srgbClr val="000000"/>
-                </a:solidFill>
-                <a:latin typeface="Red Hat Display"/>
-              </a:rPr>
-              <a:t/>
-            </a:r>
             <a:br>
               <a:rPr lang="en-IN" sz="1800" b="0" i="0" u="none" strike="noStrike" baseline="0" dirty="0">
                 <a:solidFill>
@@ -15181,15 +15090,6 @@
                 <a:latin typeface="Red Hat Display"/>
               </a:rPr>
             </a:br>
-            <a:r>
-              <a:rPr lang="en-IN" sz="1800" b="0" i="0" u="none" strike="noStrike" baseline="0" dirty="0">
-                <a:solidFill>
-                  <a:srgbClr val="000000"/>
-                </a:solidFill>
-                <a:latin typeface="Red Hat Display"/>
-              </a:rPr>
-              <a:t/>
-            </a:r>
             <a:br>
               <a:rPr lang="en-IN" sz="1800" b="0" i="0" u="none" strike="noStrike" baseline="0" dirty="0">
                 <a:solidFill>
@@ -15198,15 +15098,6 @@
                 <a:latin typeface="Red Hat Display"/>
               </a:rPr>
             </a:br>
-            <a:r>
-              <a:rPr lang="en-IN" sz="1800" b="0" i="0" u="none" strike="noStrike" baseline="0" dirty="0">
-                <a:solidFill>
-                  <a:srgbClr val="000000"/>
-                </a:solidFill>
-                <a:latin typeface="Red Hat Display"/>
-              </a:rPr>
-              <a:t/>
-            </a:r>
             <a:br>
               <a:rPr lang="en-IN" sz="1800" b="0" i="0" u="none" strike="noStrike" baseline="0" dirty="0">
                 <a:solidFill>
@@ -15254,32 +15145,16 @@
               <a:buChar char="•"/>
             </a:pPr>
             <a:r>
-              <a:rPr lang="en-US" dirty="0" smtClean="0"/>
+              <a:rPr lang="en-US" dirty="0"/>
               <a:t> Initially, we utilized a dataset sourced from </a:t>
             </a:r>
             <a:r>
-              <a:rPr lang="en-US" dirty="0" err="1" smtClean="0"/>
+              <a:rPr lang="en-US" dirty="0" err="1"/>
               <a:t>Kaggle</a:t>
             </a:r>
             <a:r>
-              <a:rPr lang="en-US" dirty="0" smtClean="0"/>
-              <a:t> and preprocessed it. </a:t>
-            </a:r>
-            <a:r>
-              <a:rPr lang="en-US" dirty="0" smtClean="0"/>
-              <a:t>   However</a:t>
-            </a:r>
-            <a:r>
-              <a:rPr lang="en-US" dirty="0" smtClean="0"/>
-              <a:t>, the results obtained under varying lighting conditions were </a:t>
-            </a:r>
-            <a:r>
-              <a:rPr lang="en-US" dirty="0" smtClean="0"/>
-              <a:t> not </a:t>
-            </a:r>
-            <a:r>
-              <a:rPr lang="en-US" dirty="0" smtClean="0"/>
-              <a:t>as anticipated, so we captured our own hand gesture images.</a:t>
+              <a:rPr lang="en-US" dirty="0"/>
+              <a:t> and preprocessed it.    However, the results obtained under varying lighting conditions were  not as anticipated, so we captured our own hand gesture images.</a:t>
             </a:r>
           </a:p>
           <a:p>
@@ -15288,12 +15163,8 @@
               <a:buChar char="•"/>
             </a:pPr>
             <a:r>
-              <a:rPr lang="en-US" dirty="0" smtClean="0"/>
-              <a:t>  </a:t>
-            </a:r>
-            <a:r>
               <a:rPr lang="en-US" dirty="0"/>
-              <a:t>The image class is represented by the first column, and the rest all represent 28x28pixels. The test data set follows the same paradigm. Before the input data can be fed into the model, it needs to be preprocessed. </a:t>
+              <a:t>  The image class is represented by the first column, and the rest all represent 28x28pixels. The test data set follows the same paradigm. Before the input data can be fed into the model, it needs to be preprocessed. </a:t>
             </a:r>
           </a:p>
           <a:p>
@@ -15303,13 +15174,8 @@
             </a:pPr>
             <a:r>
               <a:rPr lang="en-US" dirty="0"/>
-              <a:t>  Pre-processing is performed to improve data quality and speed up training. The image was transformed to a grayscale image. The highest value of the gray level range is used to normalize the gray levels in the input image. After this transformation, data splitting was performed </a:t>
-            </a:r>
-            <a:r>
-              <a:rPr lang="en-US" dirty="0" smtClean="0"/>
-              <a:t>with a ratio of 80:20.</a:t>
-            </a:r>
-            <a:endParaRPr lang="en-US" dirty="0"/>
+              <a:t>  Pre-processing is performed to improve data quality and speed up training. The image was transformed to a grayscale image. The highest value of the gray level range is used to normalize the gray levels in the input image. After this transformation, data splitting was performed with a ratio of 80:20.</a:t>
+            </a:r>
           </a:p>
         </p:txBody>
       </p:sp>
@@ -15433,7 +15299,7 @@
           <a:blip r:embed="rId2">
             <a:extLst>
               <a:ext uri="{28A0092B-C50C-407E-A947-70E740481C1C}">
-                <a14:useLocalDpi xmlns:a14="http://schemas.microsoft.com/office/drawing/2010/main" xmlns="" val="0"/>
+                <a14:useLocalDpi xmlns:a14="http://schemas.microsoft.com/office/drawing/2010/main" val="0"/>
               </a:ext>
             </a:extLst>
           </a:blip>
@@ -15452,7 +15318,7 @@
           <a:noFill/>
           <a:extLst>
             <a:ext uri="{909E8E84-426E-40DD-AFC4-6F175D3DCCD1}">
-              <a14:hiddenFill xmlns:a14="http://schemas.microsoft.com/office/drawing/2010/main" xmlns="">
+              <a14:hiddenFill xmlns:a14="http://schemas.microsoft.com/office/drawing/2010/main">
                 <a:solidFill>
                   <a:srgbClr val="FFFFFF"/>
                 </a:solidFill>
@@ -16021,7 +15887,7 @@
   <a:extraClrSchemeLst/>
   <a:extLst>
     <a:ext uri="{05A4C25C-085E-4340-85A3-A5531E510DB2}">
-      <thm15:themeFamily xmlns:thm15="http://schemas.microsoft.com/office/thememl/2012/main" xmlns="" name="Office Theme" id="{62F939B6-93AF-4DB8-9C6B-D6C7DFDC589F}" vid="{4A3C46E8-61CC-4603-A589-7422A47A8E4A}"/>
+      <thm15:themeFamily xmlns:thm15="http://schemas.microsoft.com/office/thememl/2012/main" name="Office Theme" id="{62F939B6-93AF-4DB8-9C6B-D6C7DFDC589F}" vid="{4A3C46E8-61CC-4603-A589-7422A47A8E4A}"/>
     </a:ext>
   </a:extLst>
 </a:theme>
@@ -16309,7 +16175,7 @@
   <a:extraClrSchemeLst/>
   <a:extLst>
     <a:ext uri="{05A4C25C-085E-4340-85A3-A5531E510DB2}">
-      <thm15:themeFamily xmlns:thm15="http://schemas.microsoft.com/office/thememl/2012/main" xmlns="" name="Office Theme" id="{62F939B6-93AF-4DB8-9C6B-D6C7DFDC589F}" vid="{4A3C46E8-61CC-4603-A589-7422A47A8E4A}"/>
+      <thm15:themeFamily xmlns:thm15="http://schemas.microsoft.com/office/thememl/2012/main" name="Office Theme" id="{62F939B6-93AF-4DB8-9C6B-D6C7DFDC589F}" vid="{4A3C46E8-61CC-4603-A589-7422A47A8E4A}"/>
     </a:ext>
   </a:extLst>
 </a:theme>

</xml_diff>